<commit_message>
modify the system picture
</commit_message>
<xml_diff>
--- a/EE小舖元元不絕.pptx
+++ b/EE小舖元元不絕.pptx
@@ -6424,7 +6424,7 @@
         </p:nvSpPr>
         <p:spPr>
           <a:xfrm>
-            <a:off x="6493686" y="3891701"/>
+            <a:off x="6493686" y="3915581"/>
             <a:ext cx="2614818" cy="1200329"/>
           </a:xfrm>
           <a:prstGeom prst="rect">
@@ -9519,92 +9519,9 @@
           <a:chExt cx="0" cy="0"/>
         </a:xfrm>
       </p:grpSpPr>
-      <p:sp>
-        <p:nvSpPr>
-          <p:cNvPr id="1796099" name="Rectangle 3"/>
-          <p:cNvSpPr>
-            <a:spLocks noGrp="1" noChangeArrowheads="1"/>
-          </p:cNvSpPr>
-          <p:nvPr>
-            <p:ph idx="1"/>
-          </p:nvPr>
-        </p:nvSpPr>
-        <p:spPr>
-          <a:xfrm>
-            <a:off x="2330811" y="1311845"/>
-            <a:ext cx="6172200" cy="3636169"/>
-          </a:xfrm>
-        </p:spPr>
-        <p:txBody>
-          <a:bodyPr/>
-          <a:lstStyle/>
-          <a:p>
-            <a:pPr marL="216694" lvl="1" indent="0">
-              <a:buNone/>
-            </a:pPr>
-            <a:endParaRPr lang="en-US" altLang="zh-TW" dirty="0" smtClean="0"/>
-          </a:p>
-          <a:p>
-            <a:pPr marL="216694" lvl="1" indent="0">
-              <a:buNone/>
-            </a:pPr>
-            <a:endParaRPr lang="en-US" sz="1500" dirty="0"/>
-          </a:p>
-          <a:p>
-            <a:pPr marL="216694" lvl="1" indent="0">
-              <a:buNone/>
-            </a:pPr>
-            <a:endParaRPr lang="en-US" sz="1500" dirty="0"/>
-          </a:p>
-          <a:p>
-            <a:pPr lvl="1"/>
-            <a:endParaRPr lang="en-US" sz="1500" dirty="0"/>
-          </a:p>
-          <a:p>
-            <a:pPr lvl="1"/>
-            <a:endParaRPr lang="en-US" sz="1500" dirty="0"/>
-          </a:p>
-          <a:p>
-            <a:pPr marL="216694" lvl="1" indent="0">
-              <a:buNone/>
-            </a:pPr>
-            <a:endParaRPr lang="en-US" altLang="zh-CN" sz="1500" dirty="0"/>
-          </a:p>
-          <a:p>
-            <a:pPr marL="216694" lvl="1" indent="0">
-              <a:buNone/>
-            </a:pPr>
-            <a:endParaRPr lang="en-US" altLang="zh-CN" sz="1500" dirty="0"/>
-          </a:p>
-          <a:p>
-            <a:pPr marL="216694" lvl="1" indent="0">
-              <a:buNone/>
-            </a:pPr>
-            <a:endParaRPr lang="en-US" altLang="zh-CN" sz="1500" dirty="0"/>
-          </a:p>
-          <a:p>
-            <a:pPr marL="216694" lvl="1" indent="0">
-              <a:buNone/>
-            </a:pPr>
-            <a:endParaRPr lang="en-US" altLang="zh-CN" sz="1500" dirty="0"/>
-          </a:p>
-          <a:p>
-            <a:pPr marL="216694" lvl="1" indent="0">
-              <a:buNone/>
-            </a:pPr>
-            <a:endParaRPr lang="en-US" altLang="zh-CN" sz="1500" dirty="0"/>
-          </a:p>
-          <a:p>
-            <a:pPr marL="426244" lvl="2" indent="0">
-              <a:buNone/>
-            </a:pPr>
-            <a:endParaRPr lang="en-GB" sz="1350" dirty="0"/>
-          </a:p>
-        </p:txBody>
-      </p:sp>
       <p:pic>
         <p:nvPicPr>
-          <p:cNvPr id="6146" name="Picture 2" descr="https://i.imgur.com/iyK5ivC.png"/>
+          <p:cNvPr id="1026" name="Picture 2" descr="https://i.imgur.com/UioRWNt.png"/>
           <p:cNvPicPr>
             <a:picLocks noChangeAspect="1" noChangeArrowheads="1"/>
           </p:cNvPicPr>
@@ -9625,13 +9542,22 @@
         </p:blipFill>
         <p:spPr bwMode="auto">
           <a:xfrm>
-            <a:off x="3724862" y="1053254"/>
-            <a:ext cx="3462912" cy="3894760"/>
+            <a:off x="3543633" y="987573"/>
+            <a:ext cx="3777863" cy="4032449"/>
           </a:xfrm>
           <a:prstGeom prst="rect">
             <a:avLst/>
           </a:prstGeom>
-          <a:noFill/>
+          <a:solidFill>
+            <a:srgbClr val="FFFFFF">
+              <a:shade val="85000"/>
+            </a:srgbClr>
+          </a:solidFill>
+          <a:ln w="88900" cap="sq">
+            <a:noFill/>
+            <a:miter lim="800000"/>
+          </a:ln>
+          <a:effectLst/>
           <a:extLst>
             <a:ext uri="{909E8E84-426E-40DD-AFC4-6F175D3DCCD1}">
               <a14:hiddenFill xmlns:a14="http://schemas.microsoft.com/office/drawing/2010/main">
@@ -9643,6 +9569,89 @@
           </a:extLst>
         </p:spPr>
       </p:pic>
+      <p:sp>
+        <p:nvSpPr>
+          <p:cNvPr id="1796099" name="Rectangle 3"/>
+          <p:cNvSpPr>
+            <a:spLocks noGrp="1" noChangeArrowheads="1"/>
+          </p:cNvSpPr>
+          <p:nvPr>
+            <p:ph idx="1"/>
+          </p:nvPr>
+        </p:nvSpPr>
+        <p:spPr>
+          <a:xfrm>
+            <a:off x="2330811" y="1311845"/>
+            <a:ext cx="6172200" cy="3636169"/>
+          </a:xfrm>
+        </p:spPr>
+        <p:txBody>
+          <a:bodyPr/>
+          <a:lstStyle/>
+          <a:p>
+            <a:pPr marL="216694" lvl="1" indent="0">
+              <a:buNone/>
+            </a:pPr>
+            <a:endParaRPr lang="en-US" altLang="zh-TW" dirty="0" smtClean="0"/>
+          </a:p>
+          <a:p>
+            <a:pPr marL="216694" lvl="1" indent="0">
+              <a:buNone/>
+            </a:pPr>
+            <a:endParaRPr lang="en-US" sz="1500" dirty="0"/>
+          </a:p>
+          <a:p>
+            <a:pPr marL="216694" lvl="1" indent="0">
+              <a:buNone/>
+            </a:pPr>
+            <a:endParaRPr lang="en-US" sz="1500" dirty="0"/>
+          </a:p>
+          <a:p>
+            <a:pPr lvl="1"/>
+            <a:endParaRPr lang="en-US" sz="1500" dirty="0"/>
+          </a:p>
+          <a:p>
+            <a:pPr lvl="1"/>
+            <a:endParaRPr lang="en-US" sz="1500" dirty="0"/>
+          </a:p>
+          <a:p>
+            <a:pPr marL="216694" lvl="1" indent="0">
+              <a:buNone/>
+            </a:pPr>
+            <a:endParaRPr lang="en-US" altLang="zh-CN" sz="1500" dirty="0"/>
+          </a:p>
+          <a:p>
+            <a:pPr marL="216694" lvl="1" indent="0">
+              <a:buNone/>
+            </a:pPr>
+            <a:endParaRPr lang="en-US" altLang="zh-CN" sz="1500" dirty="0"/>
+          </a:p>
+          <a:p>
+            <a:pPr marL="216694" lvl="1" indent="0">
+              <a:buNone/>
+            </a:pPr>
+            <a:endParaRPr lang="en-US" altLang="zh-CN" sz="1500" dirty="0"/>
+          </a:p>
+          <a:p>
+            <a:pPr marL="216694" lvl="1" indent="0">
+              <a:buNone/>
+            </a:pPr>
+            <a:endParaRPr lang="en-US" altLang="zh-CN" sz="1500" dirty="0"/>
+          </a:p>
+          <a:p>
+            <a:pPr marL="216694" lvl="1" indent="0">
+              <a:buNone/>
+            </a:pPr>
+            <a:endParaRPr lang="en-US" altLang="zh-CN" sz="1500" dirty="0"/>
+          </a:p>
+          <a:p>
+            <a:pPr marL="426244" lvl="2" indent="0">
+              <a:buNone/>
+            </a:pPr>
+            <a:endParaRPr lang="en-GB" sz="1350" dirty="0"/>
+          </a:p>
+        </p:txBody>
+      </p:sp>
       <p:sp>
         <p:nvSpPr>
           <p:cNvPr id="4" name="圓角矩形 3"/>

</xml_diff>